<commit_message>
updated based on recent review: 
</commit_message>
<xml_diff>
--- a/DevOpsPipeline.pptx
+++ b/DevOpsPipeline.pptx
@@ -5,12 +5,12 @@
     <p:sldMasterId id="2147483648" r:id="rId1"/>
   </p:sldMasterIdLst>
   <p:notesMasterIdLst>
-    <p:notesMasterId r:id="rId4"/>
+    <p:notesMasterId r:id="rId3"/>
   </p:notesMasterIdLst>
   <p:sldIdLst>
-    <p:sldId id="256" r:id="rId3"/>
+    <p:sldId id="256" r:id="rId2"/>
   </p:sldIdLst>
-  <p:sldSz cx="9144000" cy="5143500"/>
+  <p:sldSz cx="9144000" cy="5143500" type="screen16x9"/>
   <p:notesSz cx="6858000" cy="9144000"/>
   <p:defaultTextStyle>
     <a:defPPr marR="0" lvl="0" algn="l" rtl="0">
@@ -241,6 +241,22 @@
       </a:defRPr>
     </a:lvl9pPr>
   </p:defaultTextStyle>
+  <p:extLst>
+    <p:ext uri="{EFAFB233-063F-42B5-8137-9DF3F51BA10A}">
+      <p15:sldGuideLst xmlns:p15="http://schemas.microsoft.com/office/powerpoint/2012/main">
+        <p15:guide id="1" orient="horz" pos="1620">
+          <p15:clr>
+            <a:srgbClr val="A4A3A4"/>
+          </p15:clr>
+        </p15:guide>
+        <p15:guide id="2" pos="2880">
+          <p15:clr>
+            <a:srgbClr val="A4A3A4"/>
+          </p15:clr>
+        </p15:guide>
+      </p15:sldGuideLst>
+    </p:ext>
+  </p:extLst>
 </p:presentation>
 </file>
 
@@ -254,7 +270,7 @@
     </p:bg>
     <p:spTree>
       <p:nvGrpSpPr>
-        <p:cNvPr id="2" name="Shape 2"/>
+        <p:cNvPr id="1" name="Shape 2"/>
         <p:cNvGrpSpPr/>
         <p:nvPr/>
       </p:nvGrpSpPr>
@@ -269,7 +285,9 @@
       <p:sp>
         <p:nvSpPr>
           <p:cNvPr id="3" name="Google Shape;3;n"/>
-          <p:cNvSpPr/>
+          <p:cNvSpPr>
+            <a:spLocks noGrp="1" noRot="1" noChangeAspect="1"/>
+          </p:cNvSpPr>
           <p:nvPr>
             <p:ph type="sldImg" idx="2"/>
           </p:nvPr>
@@ -318,7 +336,9 @@
       <p:sp>
         <p:nvSpPr>
           <p:cNvPr id="4" name="Google Shape;4;n"/>
-          <p:cNvSpPr txBox="1"/>
+          <p:cNvSpPr txBox="1">
+            <a:spLocks noGrp="1"/>
+          </p:cNvSpPr>
           <p:nvPr>
             <p:ph type="body" idx="1"/>
           </p:nvPr>
@@ -441,7 +461,9 @@
               <a:defRPr sz="1100"/>
             </a:lvl9pPr>
           </a:lstStyle>
-          <a:p/>
+          <a:p>
+            <a:endParaRPr/>
+          </a:p>
         </p:txBody>
       </p:sp>
     </p:spTree>
@@ -680,11 +702,11 @@
 </file>
 
 <file path=ppt/notesSlides/notesSlide1.xml><?xml version="1.0" encoding="utf-8"?>
-<p:notes xmlns:a="http://schemas.openxmlformats.org/drawingml/2006/main" xmlns:r="http://schemas.openxmlformats.org/officeDocument/2006/relationships" xmlns:p="http://schemas.openxmlformats.org/presentationml/2006/main" showMasterPhAnim="0" showMasterSp="0">
+<p:notes xmlns:a="http://schemas.openxmlformats.org/drawingml/2006/main" xmlns:r="http://schemas.openxmlformats.org/officeDocument/2006/relationships" xmlns:p="http://schemas.openxmlformats.org/presentationml/2006/main" showMasterSp="0" showMasterPhAnim="0">
   <p:cSld>
     <p:spTree>
       <p:nvGrpSpPr>
-        <p:cNvPr id="50" name="Shape 50"/>
+        <p:cNvPr id="1" name="Shape 50"/>
         <p:cNvGrpSpPr/>
         <p:nvPr/>
       </p:nvGrpSpPr>
@@ -699,15 +721,17 @@
       <p:sp>
         <p:nvSpPr>
           <p:cNvPr id="51" name="Google Shape;51;p:notes"/>
-          <p:cNvSpPr/>
+          <p:cNvSpPr>
+            <a:spLocks noGrp="1" noRot="1" noChangeAspect="1"/>
+          </p:cNvSpPr>
           <p:nvPr>
             <p:ph type="sldImg" idx="2"/>
           </p:nvPr>
         </p:nvSpPr>
         <p:spPr>
           <a:xfrm>
-            <a:off x="381300" y="685800"/>
-            <a:ext cx="6096075" cy="3429000"/>
+            <a:off x="381000" y="685800"/>
+            <a:ext cx="6096000" cy="3429000"/>
           </a:xfrm>
           <a:custGeom>
             <a:avLst/>
@@ -738,7 +762,9 @@
       <p:sp>
         <p:nvSpPr>
           <p:cNvPr id="52" name="Google Shape;52;p:notes"/>
-          <p:cNvSpPr txBox="1"/>
+          <p:cNvSpPr txBox="1">
+            <a:spLocks noGrp="1"/>
+          </p:cNvSpPr>
           <p:nvPr>
             <p:ph type="body" idx="1"/>
           </p:nvPr>
@@ -767,6 +793,7 @@
               </a:spcAft>
               <a:buNone/>
             </a:pPr>
+            <a:endParaRPr/>
           </a:p>
         </p:txBody>
       </p:sp>
@@ -779,11 +806,11 @@
 </file>
 
 <file path=ppt/slideLayouts/slideLayout1.xml><?xml version="1.0" encoding="utf-8"?>
-<p:sldLayout xmlns:a="http://schemas.openxmlformats.org/drawingml/2006/main" xmlns:r="http://schemas.openxmlformats.org/officeDocument/2006/relationships" xmlns:p="http://schemas.openxmlformats.org/presentationml/2006/main" type="title" matchingName="Title slide">
+<p:sldLayout xmlns:a="http://schemas.openxmlformats.org/drawingml/2006/main" xmlns:r="http://schemas.openxmlformats.org/officeDocument/2006/relationships" xmlns:p="http://schemas.openxmlformats.org/presentationml/2006/main" matchingName="Title slide" type="title">
   <p:cSld name="TITLE">
     <p:spTree>
       <p:nvGrpSpPr>
-        <p:cNvPr id="9" name="Shape 9"/>
+        <p:cNvPr id="1" name="Shape 9"/>
         <p:cNvGrpSpPr/>
         <p:nvPr/>
       </p:nvGrpSpPr>
@@ -798,7 +825,9 @@
       <p:sp>
         <p:nvSpPr>
           <p:cNvPr id="10" name="Google Shape;10;p2"/>
-          <p:cNvSpPr txBox="1"/>
+          <p:cNvSpPr txBox="1">
+            <a:spLocks noGrp="1"/>
+          </p:cNvSpPr>
           <p:nvPr>
             <p:ph type="ctrTitle"/>
           </p:nvPr>
@@ -917,13 +946,17 @@
               <a:defRPr sz="5200"/>
             </a:lvl9pPr>
           </a:lstStyle>
-          <a:p/>
+          <a:p>
+            <a:endParaRPr/>
+          </a:p>
         </p:txBody>
       </p:sp>
       <p:sp>
         <p:nvSpPr>
           <p:cNvPr id="11" name="Google Shape;11;p2"/>
-          <p:cNvSpPr txBox="1"/>
+          <p:cNvSpPr txBox="1">
+            <a:spLocks noGrp="1"/>
+          </p:cNvSpPr>
           <p:nvPr>
             <p:ph type="subTitle" idx="1"/>
           </p:nvPr>
@@ -1069,13 +1102,17 @@
               <a:defRPr sz="2800"/>
             </a:lvl9pPr>
           </a:lstStyle>
-          <a:p/>
+          <a:p>
+            <a:endParaRPr/>
+          </a:p>
         </p:txBody>
       </p:sp>
       <p:sp>
         <p:nvSpPr>
           <p:cNvPr id="12" name="Google Shape;12;p2"/>
-          <p:cNvSpPr txBox="1"/>
+          <p:cNvSpPr txBox="1">
+            <a:spLocks noGrp="1"/>
+          </p:cNvSpPr>
           <p:nvPr>
             <p:ph type="sldNum" idx="12"/>
           </p:nvPr>
@@ -1143,6 +1180,7 @@
             </a:pPr>
             <a:fld id="{00000000-1234-1234-1234-123412341234}" type="slidenum">
               <a:rPr lang="en-GB"/>
+              <a:t>‹#›</a:t>
             </a:fld>
             <a:endParaRPr lang="en-GB"/>
           </a:p>
@@ -1161,7 +1199,7 @@
   <p:cSld name="BIG_NUMBER">
     <p:spTree>
       <p:nvGrpSpPr>
-        <p:cNvPr id="44" name="Shape 44"/>
+        <p:cNvPr id="1" name="Shape 44"/>
         <p:cNvGrpSpPr/>
         <p:nvPr/>
       </p:nvGrpSpPr>
@@ -1176,7 +1214,9 @@
       <p:sp>
         <p:nvSpPr>
           <p:cNvPr id="45" name="Google Shape;45;p11"/>
-          <p:cNvSpPr txBox="1"/>
+          <p:cNvSpPr txBox="1">
+            <a:spLocks noGrp="1"/>
+          </p:cNvSpPr>
           <p:nvPr>
             <p:ph type="title" hasCustomPrompt="1"/>
           </p:nvPr>
@@ -1305,7 +1345,9 @@
       <p:sp>
         <p:nvSpPr>
           <p:cNvPr id="46" name="Google Shape;46;p11"/>
-          <p:cNvSpPr txBox="1"/>
+          <p:cNvSpPr txBox="1">
+            <a:spLocks noGrp="1"/>
+          </p:cNvSpPr>
           <p:nvPr>
             <p:ph type="body" idx="1"/>
           </p:nvPr>
@@ -1424,13 +1466,17 @@
               <a:defRPr/>
             </a:lvl9pPr>
           </a:lstStyle>
-          <a:p/>
+          <a:p>
+            <a:endParaRPr/>
+          </a:p>
         </p:txBody>
       </p:sp>
       <p:sp>
         <p:nvSpPr>
           <p:cNvPr id="47" name="Google Shape;47;p11"/>
-          <p:cNvSpPr txBox="1"/>
+          <p:cNvSpPr txBox="1">
+            <a:spLocks noGrp="1"/>
+          </p:cNvSpPr>
           <p:nvPr>
             <p:ph type="sldNum" idx="12"/>
           </p:nvPr>
@@ -1498,6 +1544,7 @@
             </a:pPr>
             <a:fld id="{00000000-1234-1234-1234-123412341234}" type="slidenum">
               <a:rPr lang="en-GB"/>
+              <a:t>‹#›</a:t>
             </a:fld>
             <a:endParaRPr lang="en-GB"/>
           </a:p>
@@ -1512,11 +1559,11 @@
 </file>
 
 <file path=ppt/slideLayouts/slideLayout11.xml><?xml version="1.0" encoding="utf-8"?>
-<p:sldLayout xmlns:a="http://schemas.openxmlformats.org/drawingml/2006/main" xmlns:r="http://schemas.openxmlformats.org/officeDocument/2006/relationships" xmlns:p="http://schemas.openxmlformats.org/presentationml/2006/main" type="blank" matchingName="Blank">
+<p:sldLayout xmlns:a="http://schemas.openxmlformats.org/drawingml/2006/main" xmlns:r="http://schemas.openxmlformats.org/officeDocument/2006/relationships" xmlns:p="http://schemas.openxmlformats.org/presentationml/2006/main" matchingName="Blank" type="blank">
   <p:cSld name="BLANK">
     <p:spTree>
       <p:nvGrpSpPr>
-        <p:cNvPr id="48" name="Shape 48"/>
+        <p:cNvPr id="1" name="Shape 48"/>
         <p:cNvGrpSpPr/>
         <p:nvPr/>
       </p:nvGrpSpPr>
@@ -1531,7 +1578,9 @@
       <p:sp>
         <p:nvSpPr>
           <p:cNvPr id="49" name="Google Shape;49;p12"/>
-          <p:cNvSpPr txBox="1"/>
+          <p:cNvSpPr txBox="1">
+            <a:spLocks noGrp="1"/>
+          </p:cNvSpPr>
           <p:nvPr>
             <p:ph type="sldNum" idx="12"/>
           </p:nvPr>
@@ -1599,6 +1648,7 @@
             </a:pPr>
             <a:fld id="{00000000-1234-1234-1234-123412341234}" type="slidenum">
               <a:rPr lang="en-GB"/>
+              <a:t>‹#›</a:t>
             </a:fld>
             <a:endParaRPr lang="en-GB"/>
           </a:p>
@@ -1613,11 +1663,11 @@
 </file>
 
 <file path=ppt/slideLayouts/slideLayout2.xml><?xml version="1.0" encoding="utf-8"?>
-<p:sldLayout xmlns:a="http://schemas.openxmlformats.org/drawingml/2006/main" xmlns:r="http://schemas.openxmlformats.org/officeDocument/2006/relationships" xmlns:p="http://schemas.openxmlformats.org/presentationml/2006/main" type="secHead" matchingName="Section header">
+<p:sldLayout xmlns:a="http://schemas.openxmlformats.org/drawingml/2006/main" xmlns:r="http://schemas.openxmlformats.org/officeDocument/2006/relationships" xmlns:p="http://schemas.openxmlformats.org/presentationml/2006/main" matchingName="Section header" type="secHead">
   <p:cSld name="SECTION_HEADER">
     <p:spTree>
       <p:nvGrpSpPr>
-        <p:cNvPr id="13" name="Shape 13"/>
+        <p:cNvPr id="1" name="Shape 13"/>
         <p:cNvGrpSpPr/>
         <p:nvPr/>
       </p:nvGrpSpPr>
@@ -1632,7 +1682,9 @@
       <p:sp>
         <p:nvSpPr>
           <p:cNvPr id="14" name="Google Shape;14;p3"/>
-          <p:cNvSpPr txBox="1"/>
+          <p:cNvSpPr txBox="1">
+            <a:spLocks noGrp="1"/>
+          </p:cNvSpPr>
           <p:nvPr>
             <p:ph type="title"/>
           </p:nvPr>
@@ -1751,13 +1803,17 @@
               <a:defRPr sz="3600"/>
             </a:lvl9pPr>
           </a:lstStyle>
-          <a:p/>
+          <a:p>
+            <a:endParaRPr/>
+          </a:p>
         </p:txBody>
       </p:sp>
       <p:sp>
         <p:nvSpPr>
           <p:cNvPr id="15" name="Google Shape;15;p3"/>
-          <p:cNvSpPr txBox="1"/>
+          <p:cNvSpPr txBox="1">
+            <a:spLocks noGrp="1"/>
+          </p:cNvSpPr>
           <p:nvPr>
             <p:ph type="sldNum" idx="12"/>
           </p:nvPr>
@@ -1825,6 +1881,7 @@
             </a:pPr>
             <a:fld id="{00000000-1234-1234-1234-123412341234}" type="slidenum">
               <a:rPr lang="en-GB"/>
+              <a:t>‹#›</a:t>
             </a:fld>
             <a:endParaRPr lang="en-GB"/>
           </a:p>
@@ -1839,11 +1896,11 @@
 </file>
 
 <file path=ppt/slideLayouts/slideLayout3.xml><?xml version="1.0" encoding="utf-8"?>
-<p:sldLayout xmlns:a="http://schemas.openxmlformats.org/drawingml/2006/main" xmlns:r="http://schemas.openxmlformats.org/officeDocument/2006/relationships" xmlns:p="http://schemas.openxmlformats.org/presentationml/2006/main" type="tx" matchingName="Title and body">
+<p:sldLayout xmlns:a="http://schemas.openxmlformats.org/drawingml/2006/main" xmlns:r="http://schemas.openxmlformats.org/officeDocument/2006/relationships" xmlns:p="http://schemas.openxmlformats.org/presentationml/2006/main" matchingName="Title and body" type="tx">
   <p:cSld name="TITLE_AND_BODY">
     <p:spTree>
       <p:nvGrpSpPr>
-        <p:cNvPr id="16" name="Shape 16"/>
+        <p:cNvPr id="1" name="Shape 16"/>
         <p:cNvGrpSpPr/>
         <p:nvPr/>
       </p:nvGrpSpPr>
@@ -1858,7 +1915,9 @@
       <p:sp>
         <p:nvSpPr>
           <p:cNvPr id="17" name="Google Shape;17;p4"/>
-          <p:cNvSpPr txBox="1"/>
+          <p:cNvSpPr txBox="1">
+            <a:spLocks noGrp="1"/>
+          </p:cNvSpPr>
           <p:nvPr>
             <p:ph type="title"/>
           </p:nvPr>
@@ -1977,13 +2036,17 @@
               <a:defRPr/>
             </a:lvl9pPr>
           </a:lstStyle>
-          <a:p/>
+          <a:p>
+            <a:endParaRPr/>
+          </a:p>
         </p:txBody>
       </p:sp>
       <p:sp>
         <p:nvSpPr>
           <p:cNvPr id="18" name="Google Shape;18;p4"/>
-          <p:cNvSpPr txBox="1"/>
+          <p:cNvSpPr txBox="1">
+            <a:spLocks noGrp="1"/>
+          </p:cNvSpPr>
           <p:nvPr>
             <p:ph type="body" idx="1"/>
           </p:nvPr>
@@ -2102,13 +2165,17 @@
               <a:defRPr/>
             </a:lvl9pPr>
           </a:lstStyle>
-          <a:p/>
+          <a:p>
+            <a:endParaRPr/>
+          </a:p>
         </p:txBody>
       </p:sp>
       <p:sp>
         <p:nvSpPr>
           <p:cNvPr id="19" name="Google Shape;19;p4"/>
-          <p:cNvSpPr txBox="1"/>
+          <p:cNvSpPr txBox="1">
+            <a:spLocks noGrp="1"/>
+          </p:cNvSpPr>
           <p:nvPr>
             <p:ph type="sldNum" idx="12"/>
           </p:nvPr>
@@ -2176,6 +2243,7 @@
             </a:pPr>
             <a:fld id="{00000000-1234-1234-1234-123412341234}" type="slidenum">
               <a:rPr lang="en-GB"/>
+              <a:t>‹#›</a:t>
             </a:fld>
             <a:endParaRPr lang="en-GB"/>
           </a:p>
@@ -2190,11 +2258,11 @@
 </file>
 
 <file path=ppt/slideLayouts/slideLayout4.xml><?xml version="1.0" encoding="utf-8"?>
-<p:sldLayout xmlns:a="http://schemas.openxmlformats.org/drawingml/2006/main" xmlns:r="http://schemas.openxmlformats.org/officeDocument/2006/relationships" xmlns:p="http://schemas.openxmlformats.org/presentationml/2006/main" type="twoColTx" matchingName="Title and two columns">
+<p:sldLayout xmlns:a="http://schemas.openxmlformats.org/drawingml/2006/main" xmlns:r="http://schemas.openxmlformats.org/officeDocument/2006/relationships" xmlns:p="http://schemas.openxmlformats.org/presentationml/2006/main" matchingName="Title and two columns" type="twoColTx">
   <p:cSld name="TITLE_AND_TWO_COLUMNS">
     <p:spTree>
       <p:nvGrpSpPr>
-        <p:cNvPr id="20" name="Shape 20"/>
+        <p:cNvPr id="1" name="Shape 20"/>
         <p:cNvGrpSpPr/>
         <p:nvPr/>
       </p:nvGrpSpPr>
@@ -2209,7 +2277,9 @@
       <p:sp>
         <p:nvSpPr>
           <p:cNvPr id="21" name="Google Shape;21;p5"/>
-          <p:cNvSpPr txBox="1"/>
+          <p:cNvSpPr txBox="1">
+            <a:spLocks noGrp="1"/>
+          </p:cNvSpPr>
           <p:nvPr>
             <p:ph type="title"/>
           </p:nvPr>
@@ -2328,13 +2398,17 @@
               <a:defRPr/>
             </a:lvl9pPr>
           </a:lstStyle>
-          <a:p/>
+          <a:p>
+            <a:endParaRPr/>
+          </a:p>
         </p:txBody>
       </p:sp>
       <p:sp>
         <p:nvSpPr>
           <p:cNvPr id="22" name="Google Shape;22;p5"/>
-          <p:cNvSpPr txBox="1"/>
+          <p:cNvSpPr txBox="1">
+            <a:spLocks noGrp="1"/>
+          </p:cNvSpPr>
           <p:nvPr>
             <p:ph type="body" idx="1"/>
           </p:nvPr>
@@ -2453,13 +2527,17 @@
               <a:defRPr sz="1200"/>
             </a:lvl9pPr>
           </a:lstStyle>
-          <a:p/>
+          <a:p>
+            <a:endParaRPr/>
+          </a:p>
         </p:txBody>
       </p:sp>
       <p:sp>
         <p:nvSpPr>
           <p:cNvPr id="23" name="Google Shape;23;p5"/>
-          <p:cNvSpPr txBox="1"/>
+          <p:cNvSpPr txBox="1">
+            <a:spLocks noGrp="1"/>
+          </p:cNvSpPr>
           <p:nvPr>
             <p:ph type="body" idx="2"/>
           </p:nvPr>
@@ -2578,13 +2656,17 @@
               <a:defRPr sz="1200"/>
             </a:lvl9pPr>
           </a:lstStyle>
-          <a:p/>
+          <a:p>
+            <a:endParaRPr/>
+          </a:p>
         </p:txBody>
       </p:sp>
       <p:sp>
         <p:nvSpPr>
           <p:cNvPr id="24" name="Google Shape;24;p5"/>
-          <p:cNvSpPr txBox="1"/>
+          <p:cNvSpPr txBox="1">
+            <a:spLocks noGrp="1"/>
+          </p:cNvSpPr>
           <p:nvPr>
             <p:ph type="sldNum" idx="12"/>
           </p:nvPr>
@@ -2652,6 +2734,7 @@
             </a:pPr>
             <a:fld id="{00000000-1234-1234-1234-123412341234}" type="slidenum">
               <a:rPr lang="en-GB"/>
+              <a:t>‹#›</a:t>
             </a:fld>
             <a:endParaRPr lang="en-GB"/>
           </a:p>
@@ -2666,11 +2749,11 @@
 </file>
 
 <file path=ppt/slideLayouts/slideLayout5.xml><?xml version="1.0" encoding="utf-8"?>
-<p:sldLayout xmlns:a="http://schemas.openxmlformats.org/drawingml/2006/main" xmlns:r="http://schemas.openxmlformats.org/officeDocument/2006/relationships" xmlns:p="http://schemas.openxmlformats.org/presentationml/2006/main" type="titleOnly" matchingName="Title only">
+<p:sldLayout xmlns:a="http://schemas.openxmlformats.org/drawingml/2006/main" xmlns:r="http://schemas.openxmlformats.org/officeDocument/2006/relationships" xmlns:p="http://schemas.openxmlformats.org/presentationml/2006/main" matchingName="Title only" type="titleOnly">
   <p:cSld name="TITLE_ONLY">
     <p:spTree>
       <p:nvGrpSpPr>
-        <p:cNvPr id="25" name="Shape 25"/>
+        <p:cNvPr id="1" name="Shape 25"/>
         <p:cNvGrpSpPr/>
         <p:nvPr/>
       </p:nvGrpSpPr>
@@ -2685,7 +2768,9 @@
       <p:sp>
         <p:nvSpPr>
           <p:cNvPr id="26" name="Google Shape;26;p6"/>
-          <p:cNvSpPr txBox="1"/>
+          <p:cNvSpPr txBox="1">
+            <a:spLocks noGrp="1"/>
+          </p:cNvSpPr>
           <p:nvPr>
             <p:ph type="title"/>
           </p:nvPr>
@@ -2804,13 +2889,17 @@
               <a:defRPr/>
             </a:lvl9pPr>
           </a:lstStyle>
-          <a:p/>
+          <a:p>
+            <a:endParaRPr/>
+          </a:p>
         </p:txBody>
       </p:sp>
       <p:sp>
         <p:nvSpPr>
           <p:cNvPr id="27" name="Google Shape;27;p6"/>
-          <p:cNvSpPr txBox="1"/>
+          <p:cNvSpPr txBox="1">
+            <a:spLocks noGrp="1"/>
+          </p:cNvSpPr>
           <p:nvPr>
             <p:ph type="sldNum" idx="12"/>
           </p:nvPr>
@@ -2878,6 +2967,7 @@
             </a:pPr>
             <a:fld id="{00000000-1234-1234-1234-123412341234}" type="slidenum">
               <a:rPr lang="en-GB"/>
+              <a:t>‹#›</a:t>
             </a:fld>
             <a:endParaRPr lang="en-GB"/>
           </a:p>
@@ -2896,7 +2986,7 @@
   <p:cSld name="ONE_COLUMN_TEXT">
     <p:spTree>
       <p:nvGrpSpPr>
-        <p:cNvPr id="28" name="Shape 28"/>
+        <p:cNvPr id="1" name="Shape 28"/>
         <p:cNvGrpSpPr/>
         <p:nvPr/>
       </p:nvGrpSpPr>
@@ -2911,7 +3001,9 @@
       <p:sp>
         <p:nvSpPr>
           <p:cNvPr id="29" name="Google Shape;29;p7"/>
-          <p:cNvSpPr txBox="1"/>
+          <p:cNvSpPr txBox="1">
+            <a:spLocks noGrp="1"/>
+          </p:cNvSpPr>
           <p:nvPr>
             <p:ph type="title"/>
           </p:nvPr>
@@ -3030,13 +3122,17 @@
               <a:defRPr sz="2400"/>
             </a:lvl9pPr>
           </a:lstStyle>
-          <a:p/>
+          <a:p>
+            <a:endParaRPr/>
+          </a:p>
         </p:txBody>
       </p:sp>
       <p:sp>
         <p:nvSpPr>
           <p:cNvPr id="30" name="Google Shape;30;p7"/>
-          <p:cNvSpPr txBox="1"/>
+          <p:cNvSpPr txBox="1">
+            <a:spLocks noGrp="1"/>
+          </p:cNvSpPr>
           <p:nvPr>
             <p:ph type="body" idx="1"/>
           </p:nvPr>
@@ -3155,13 +3251,17 @@
               <a:defRPr sz="1200"/>
             </a:lvl9pPr>
           </a:lstStyle>
-          <a:p/>
+          <a:p>
+            <a:endParaRPr/>
+          </a:p>
         </p:txBody>
       </p:sp>
       <p:sp>
         <p:nvSpPr>
           <p:cNvPr id="31" name="Google Shape;31;p7"/>
-          <p:cNvSpPr txBox="1"/>
+          <p:cNvSpPr txBox="1">
+            <a:spLocks noGrp="1"/>
+          </p:cNvSpPr>
           <p:nvPr>
             <p:ph type="sldNum" idx="12"/>
           </p:nvPr>
@@ -3229,6 +3329,7 @@
             </a:pPr>
             <a:fld id="{00000000-1234-1234-1234-123412341234}" type="slidenum">
               <a:rPr lang="en-GB"/>
+              <a:t>‹#›</a:t>
             </a:fld>
             <a:endParaRPr lang="en-GB"/>
           </a:p>
@@ -3247,7 +3348,7 @@
   <p:cSld name="MAIN_POINT">
     <p:spTree>
       <p:nvGrpSpPr>
-        <p:cNvPr id="32" name="Shape 32"/>
+        <p:cNvPr id="1" name="Shape 32"/>
         <p:cNvGrpSpPr/>
         <p:nvPr/>
       </p:nvGrpSpPr>
@@ -3262,7 +3363,9 @@
       <p:sp>
         <p:nvSpPr>
           <p:cNvPr id="33" name="Google Shape;33;p8"/>
-          <p:cNvSpPr txBox="1"/>
+          <p:cNvSpPr txBox="1">
+            <a:spLocks noGrp="1"/>
+          </p:cNvSpPr>
           <p:nvPr>
             <p:ph type="title"/>
           </p:nvPr>
@@ -3381,13 +3484,17 @@
               <a:defRPr sz="4800"/>
             </a:lvl9pPr>
           </a:lstStyle>
-          <a:p/>
+          <a:p>
+            <a:endParaRPr/>
+          </a:p>
         </p:txBody>
       </p:sp>
       <p:sp>
         <p:nvSpPr>
           <p:cNvPr id="34" name="Google Shape;34;p8"/>
-          <p:cNvSpPr txBox="1"/>
+          <p:cNvSpPr txBox="1">
+            <a:spLocks noGrp="1"/>
+          </p:cNvSpPr>
           <p:nvPr>
             <p:ph type="sldNum" idx="12"/>
           </p:nvPr>
@@ -3455,6 +3562,7 @@
             </a:pPr>
             <a:fld id="{00000000-1234-1234-1234-123412341234}" type="slidenum">
               <a:rPr lang="en-GB"/>
+              <a:t>‹#›</a:t>
             </a:fld>
             <a:endParaRPr lang="en-GB"/>
           </a:p>
@@ -3473,7 +3581,7 @@
   <p:cSld name="SECTION_TITLE_AND_DESCRIPTION">
     <p:spTree>
       <p:nvGrpSpPr>
-        <p:cNvPr id="35" name="Shape 35"/>
+        <p:cNvPr id="1" name="Shape 35"/>
         <p:cNvGrpSpPr/>
         <p:nvPr/>
       </p:nvGrpSpPr>
@@ -3521,13 +3629,16 @@
               </a:spcAft>
               <a:buNone/>
             </a:pPr>
+            <a:endParaRPr/>
           </a:p>
         </p:txBody>
       </p:sp>
       <p:sp>
         <p:nvSpPr>
           <p:cNvPr id="37" name="Google Shape;37;p9"/>
-          <p:cNvSpPr txBox="1"/>
+          <p:cNvSpPr txBox="1">
+            <a:spLocks noGrp="1"/>
+          </p:cNvSpPr>
           <p:nvPr>
             <p:ph type="title"/>
           </p:nvPr>
@@ -3646,13 +3757,17 @@
               <a:defRPr sz="4200"/>
             </a:lvl9pPr>
           </a:lstStyle>
-          <a:p/>
+          <a:p>
+            <a:endParaRPr/>
+          </a:p>
         </p:txBody>
       </p:sp>
       <p:sp>
         <p:nvSpPr>
           <p:cNvPr id="38" name="Google Shape;38;p9"/>
-          <p:cNvSpPr txBox="1"/>
+          <p:cNvSpPr txBox="1">
+            <a:spLocks noGrp="1"/>
+          </p:cNvSpPr>
           <p:nvPr>
             <p:ph type="subTitle" idx="1"/>
           </p:nvPr>
@@ -3798,13 +3913,17 @@
               <a:defRPr sz="2100"/>
             </a:lvl9pPr>
           </a:lstStyle>
-          <a:p/>
+          <a:p>
+            <a:endParaRPr/>
+          </a:p>
         </p:txBody>
       </p:sp>
       <p:sp>
         <p:nvSpPr>
           <p:cNvPr id="39" name="Google Shape;39;p9"/>
-          <p:cNvSpPr txBox="1"/>
+          <p:cNvSpPr txBox="1">
+            <a:spLocks noGrp="1"/>
+          </p:cNvSpPr>
           <p:nvPr>
             <p:ph type="body" idx="2"/>
           </p:nvPr>
@@ -3923,13 +4042,17 @@
               <a:defRPr/>
             </a:lvl9pPr>
           </a:lstStyle>
-          <a:p/>
+          <a:p>
+            <a:endParaRPr/>
+          </a:p>
         </p:txBody>
       </p:sp>
       <p:sp>
         <p:nvSpPr>
           <p:cNvPr id="40" name="Google Shape;40;p9"/>
-          <p:cNvSpPr txBox="1"/>
+          <p:cNvSpPr txBox="1">
+            <a:spLocks noGrp="1"/>
+          </p:cNvSpPr>
           <p:nvPr>
             <p:ph type="sldNum" idx="12"/>
           </p:nvPr>
@@ -3997,6 +4120,7 @@
             </a:pPr>
             <a:fld id="{00000000-1234-1234-1234-123412341234}" type="slidenum">
               <a:rPr lang="en-GB"/>
+              <a:t>‹#›</a:t>
             </a:fld>
             <a:endParaRPr lang="en-GB"/>
           </a:p>
@@ -4015,7 +4139,7 @@
   <p:cSld name="CAPTION_ONLY">
     <p:spTree>
       <p:nvGrpSpPr>
-        <p:cNvPr id="41" name="Shape 41"/>
+        <p:cNvPr id="1" name="Shape 41"/>
         <p:cNvGrpSpPr/>
         <p:nvPr/>
       </p:nvGrpSpPr>
@@ -4030,7 +4154,9 @@
       <p:sp>
         <p:nvSpPr>
           <p:cNvPr id="42" name="Google Shape;42;p10"/>
-          <p:cNvSpPr txBox="1"/>
+          <p:cNvSpPr txBox="1">
+            <a:spLocks noGrp="1"/>
+          </p:cNvSpPr>
           <p:nvPr>
             <p:ph type="body" idx="1"/>
           </p:nvPr>
@@ -4064,13 +4190,17 @@
               <a:defRPr/>
             </a:lvl1pPr>
           </a:lstStyle>
-          <a:p/>
+          <a:p>
+            <a:endParaRPr/>
+          </a:p>
         </p:txBody>
       </p:sp>
       <p:sp>
         <p:nvSpPr>
           <p:cNvPr id="43" name="Google Shape;43;p10"/>
-          <p:cNvSpPr txBox="1"/>
+          <p:cNvSpPr txBox="1">
+            <a:spLocks noGrp="1"/>
+          </p:cNvSpPr>
           <p:nvPr>
             <p:ph type="sldNum" idx="12"/>
           </p:nvPr>
@@ -4138,6 +4268,7 @@
             </a:pPr>
             <a:fld id="{00000000-1234-1234-1234-123412341234}" type="slidenum">
               <a:rPr lang="en-GB"/>
+              <a:t>‹#›</a:t>
             </a:fld>
             <a:endParaRPr lang="en-GB"/>
           </a:p>
@@ -4164,7 +4295,7 @@
     </p:bg>
     <p:spTree>
       <p:nvGrpSpPr>
-        <p:cNvPr id="5" name="Shape 5"/>
+        <p:cNvPr id="1" name="Shape 5"/>
         <p:cNvGrpSpPr/>
         <p:nvPr/>
       </p:nvGrpSpPr>
@@ -4179,7 +4310,9 @@
       <p:sp>
         <p:nvSpPr>
           <p:cNvPr id="6" name="Google Shape;6;p1"/>
-          <p:cNvSpPr txBox="1"/>
+          <p:cNvSpPr txBox="1">
+            <a:spLocks noGrp="1"/>
+          </p:cNvSpPr>
           <p:nvPr>
             <p:ph type="title"/>
           </p:nvPr>
@@ -4365,13 +4498,17 @@
               </a:defRPr>
             </a:lvl9pPr>
           </a:lstStyle>
-          <a:p/>
+          <a:p>
+            <a:endParaRPr/>
+          </a:p>
         </p:txBody>
       </p:sp>
       <p:sp>
         <p:nvSpPr>
           <p:cNvPr id="7" name="Google Shape;7;p1"/>
-          <p:cNvSpPr txBox="1"/>
+          <p:cNvSpPr txBox="1">
+            <a:spLocks noGrp="1"/>
+          </p:cNvSpPr>
           <p:nvPr>
             <p:ph type="body" idx="1"/>
           </p:nvPr>
@@ -4584,13 +4721,17 @@
               </a:defRPr>
             </a:lvl9pPr>
           </a:lstStyle>
-          <a:p/>
+          <a:p>
+            <a:endParaRPr/>
+          </a:p>
         </p:txBody>
       </p:sp>
       <p:sp>
         <p:nvSpPr>
           <p:cNvPr id="8" name="Google Shape;8;p1"/>
-          <p:cNvSpPr txBox="1"/>
+          <p:cNvSpPr txBox="1">
+            <a:spLocks noGrp="1"/>
+          </p:cNvSpPr>
           <p:nvPr>
             <p:ph type="sldNum" idx="12"/>
           </p:nvPr>
@@ -4698,6 +4839,7 @@
             </a:pPr>
             <a:fld id="{00000000-1234-1234-1234-123412341234}" type="slidenum">
               <a:rPr lang="en-GB"/>
+              <a:t>‹#›</a:t>
             </a:fld>
             <a:endParaRPr lang="en-GB"/>
           </a:p>
@@ -5417,7 +5559,7 @@
   <p:cSld>
     <p:spTree>
       <p:nvGrpSpPr>
-        <p:cNvPr id="53" name="Shape 53"/>
+        <p:cNvPr id="1" name="Shape 53"/>
         <p:cNvGrpSpPr/>
         <p:nvPr/>
       </p:nvGrpSpPr>
@@ -5431,22 +5573,28 @@
       </p:grpSpPr>
       <p:pic>
         <p:nvPicPr>
-          <p:cNvPr id="1" name="Picture 0" descr="DevSecOpsPipeline"/>
+          <p:cNvPr id="4" name="Picture 3" descr="A screenshot of a cell phone&#10;&#10;Description automatically generated">
+            <a:extLst>
+              <a:ext uri="{FF2B5EF4-FFF2-40B4-BE49-F238E27FC236}">
+                <a16:creationId xmlns:a16="http://schemas.microsoft.com/office/drawing/2014/main" id="{A6C04805-E35F-4709-B700-2267CB0C9D42}"/>
+              </a:ext>
+            </a:extLst>
+          </p:cNvPr>
           <p:cNvPicPr>
             <a:picLocks noChangeAspect="1"/>
           </p:cNvPicPr>
           <p:nvPr/>
         </p:nvPicPr>
         <p:blipFill>
-          <a:blip r:embed="rId1"/>
+          <a:blip r:embed="rId3"/>
           <a:stretch>
             <a:fillRect/>
           </a:stretch>
         </p:blipFill>
         <p:spPr>
           <a:xfrm>
-            <a:off x="36830" y="1177290"/>
-            <a:ext cx="8940800" cy="3038475"/>
+            <a:off x="0" y="662029"/>
+            <a:ext cx="9144000" cy="3819441"/>
           </a:xfrm>
           <a:prstGeom prst="rect">
             <a:avLst/>
@@ -5737,6 +5885,8 @@
       </a:bgFillStyleLst>
     </a:fmtScheme>
   </a:themeElements>
+  <a:objectDefaults/>
+  <a:extraClrSchemeLst/>
   <a:extLst>
     <a:ext uri="{05A4C25C-085E-4340-85A3-A5531E510DB2}">
       <thm15:themeFamily xmlns:thm15="http://schemas.microsoft.com/office/thememl/2012/main" name="Office Theme" id="{62F939B6-93AF-4DB8-9C6B-D6C7DFDC589F}" vid="{4A3C46E8-61CC-4603-A589-7422A47A8E4A}"/>
@@ -6021,6 +6171,8 @@
       </a:bgFillStyleLst>
     </a:fmtScheme>
   </a:themeElements>
+  <a:objectDefaults/>
+  <a:extraClrSchemeLst/>
   <a:extLst>
     <a:ext uri="{05A4C25C-085E-4340-85A3-A5531E510DB2}">
       <thm15:themeFamily xmlns:thm15="http://schemas.microsoft.com/office/thememl/2012/main" name="Office Theme" id="{62F939B6-93AF-4DB8-9C6B-D6C7DFDC589F}" vid="{4A3C46E8-61CC-4603-A589-7422A47A8E4A}"/>

</xml_diff>